<commit_message>
[ANV] updated paper logic
</commit_message>
<xml_diff>
--- a/notes/anthony/nrFanoPaper_logic.pptx
+++ b/notes/anthony/nrFanoPaper_logic.pptx
@@ -106,6 +106,11 @@
       </a:defRPr>
     </a:lvl9pPr>
   </p:defaultTextStyle>
+  <p:extLst>
+    <p:ext uri="{EFAFB233-063F-42B5-8137-9DF3F51BA10A}">
+      <p15:sldGuideLst xmlns:p15="http://schemas.microsoft.com/office/powerpoint/2012/main"/>
+    </p:ext>
+  </p:extLst>
 </p:presentation>
 </file>
 
@@ -256,7 +261,7 @@
           <a:p>
             <a:fld id="{542A4B59-5918-EA42-8C30-5F731BD35FB1}" type="datetimeFigureOut">
               <a:rPr lang="en-US" smtClean="0"/>
-              <a:t>4/17/19</a:t>
+              <a:t>5/4/19</a:t>
             </a:fld>
             <a:endParaRPr lang="en-US"/>
           </a:p>
@@ -454,7 +459,7 @@
           <a:p>
             <a:fld id="{542A4B59-5918-EA42-8C30-5F731BD35FB1}" type="datetimeFigureOut">
               <a:rPr lang="en-US" smtClean="0"/>
-              <a:t>4/17/19</a:t>
+              <a:t>5/4/19</a:t>
             </a:fld>
             <a:endParaRPr lang="en-US"/>
           </a:p>
@@ -662,7 +667,7 @@
           <a:p>
             <a:fld id="{542A4B59-5918-EA42-8C30-5F731BD35FB1}" type="datetimeFigureOut">
               <a:rPr lang="en-US" smtClean="0"/>
-              <a:t>4/17/19</a:t>
+              <a:t>5/4/19</a:t>
             </a:fld>
             <a:endParaRPr lang="en-US"/>
           </a:p>
@@ -860,7 +865,7 @@
           <a:p>
             <a:fld id="{542A4B59-5918-EA42-8C30-5F731BD35FB1}" type="datetimeFigureOut">
               <a:rPr lang="en-US" smtClean="0"/>
-              <a:t>4/17/19</a:t>
+              <a:t>5/4/19</a:t>
             </a:fld>
             <a:endParaRPr lang="en-US"/>
           </a:p>
@@ -1135,7 +1140,7 @@
           <a:p>
             <a:fld id="{542A4B59-5918-EA42-8C30-5F731BD35FB1}" type="datetimeFigureOut">
               <a:rPr lang="en-US" smtClean="0"/>
-              <a:t>4/17/19</a:t>
+              <a:t>5/4/19</a:t>
             </a:fld>
             <a:endParaRPr lang="en-US"/>
           </a:p>
@@ -1400,7 +1405,7 @@
           <a:p>
             <a:fld id="{542A4B59-5918-EA42-8C30-5F731BD35FB1}" type="datetimeFigureOut">
               <a:rPr lang="en-US" smtClean="0"/>
-              <a:t>4/17/19</a:t>
+              <a:t>5/4/19</a:t>
             </a:fld>
             <a:endParaRPr lang="en-US"/>
           </a:p>
@@ -1812,7 +1817,7 @@
           <a:p>
             <a:fld id="{542A4B59-5918-EA42-8C30-5F731BD35FB1}" type="datetimeFigureOut">
               <a:rPr lang="en-US" smtClean="0"/>
-              <a:t>4/17/19</a:t>
+              <a:t>5/4/19</a:t>
             </a:fld>
             <a:endParaRPr lang="en-US"/>
           </a:p>
@@ -1953,7 +1958,7 @@
           <a:p>
             <a:fld id="{542A4B59-5918-EA42-8C30-5F731BD35FB1}" type="datetimeFigureOut">
               <a:rPr lang="en-US" smtClean="0"/>
-              <a:t>4/17/19</a:t>
+              <a:t>5/4/19</a:t>
             </a:fld>
             <a:endParaRPr lang="en-US"/>
           </a:p>
@@ -2066,7 +2071,7 @@
           <a:p>
             <a:fld id="{542A4B59-5918-EA42-8C30-5F731BD35FB1}" type="datetimeFigureOut">
               <a:rPr lang="en-US" smtClean="0"/>
-              <a:t>4/17/19</a:t>
+              <a:t>5/4/19</a:t>
             </a:fld>
             <a:endParaRPr lang="en-US"/>
           </a:p>
@@ -2377,7 +2382,7 @@
           <a:p>
             <a:fld id="{542A4B59-5918-EA42-8C30-5F731BD35FB1}" type="datetimeFigureOut">
               <a:rPr lang="en-US" smtClean="0"/>
-              <a:t>4/17/19</a:t>
+              <a:t>5/4/19</a:t>
             </a:fld>
             <a:endParaRPr lang="en-US"/>
           </a:p>
@@ -2665,7 +2670,7 @@
           <a:p>
             <a:fld id="{542A4B59-5918-EA42-8C30-5F731BD35FB1}" type="datetimeFigureOut">
               <a:rPr lang="en-US" smtClean="0"/>
-              <a:t>4/17/19</a:t>
+              <a:t>5/4/19</a:t>
             </a:fld>
             <a:endParaRPr lang="en-US"/>
           </a:p>
@@ -2906,7 +2911,7 @@
           <a:p>
             <a:fld id="{542A4B59-5918-EA42-8C30-5F731BD35FB1}" type="datetimeFigureOut">
               <a:rPr lang="en-US" smtClean="0"/>
-              <a:t>4/17/19</a:t>
+              <a:t>5/4/19</a:t>
             </a:fld>
             <a:endParaRPr lang="en-US"/>
           </a:p>
@@ -3495,7 +3500,7 @@
             </a:pPr>
             <a:r>
               <a:rPr lang="en-US" dirty="0"/>
-              <a:t>Edelweiss has previously published an NR variance that is larger than predicted</a:t>
+              <a:t>Edelweiss has previously published an NR variance that is larger than predicted by resolutions</a:t>
             </a:r>
           </a:p>
           <a:p>
@@ -3504,7 +3509,7 @@
               <a:buAutoNum type="arabicPeriod"/>
             </a:pPr>
             <a:r>
-              <a:rPr lang="en-US" dirty="0"/>
+              <a:rPr lang="en-US" strike="sngStrike" dirty="0"/>
               <a:t>Edelweiss has published resolutions and yields for early detectors (2004)</a:t>
             </a:r>
           </a:p>
@@ -3514,22 +3519,17 @@
               <a:buAutoNum type="arabicPeriod"/>
             </a:pPr>
             <a:r>
-              <a:rPr lang="en-US" dirty="0"/>
+              <a:rPr lang="en-US" strike="sngStrike" dirty="0"/>
               <a:t>(Super)CDMS has not published resolutions but we can approximate the (side-by-side </a:t>
             </a:r>
             <a:r>
-              <a:rPr lang="en-US" dirty="0" err="1"/>
+              <a:rPr lang="en-US" strike="sngStrike" dirty="0" err="1"/>
               <a:t>Edw</a:t>
             </a:r>
             <a:r>
-              <a:rPr lang="en-US" dirty="0"/>
-              <a:t> and CDMS bands, with our </a:t>
-            </a:r>
-            <a:r>
-              <a:rPr lang="en-US"/>
-              <a:t>predictions overlaid, for ER/NR WITHOUT Fano)</a:t>
-            </a:r>
-            <a:endParaRPr lang="en-US" dirty="0"/>
+              <a:rPr lang="en-US" strike="sngStrike" dirty="0"/>
+              <a:t> and CDMS bands, with our predictions overlaid, for ER/NR WITHOUT Fano)</a:t>
+            </a:r>
           </a:p>
           <a:p>
             <a:pPr marL="342900" indent="-342900">
@@ -3626,7 +3626,7 @@
         <p:spPr>
           <a:xfrm>
             <a:off x="838200" y="1690688"/>
-            <a:ext cx="10545323" cy="2585323"/>
+            <a:ext cx="10545323" cy="3416320"/>
           </a:xfrm>
           <a:prstGeom prst="rect">
             <a:avLst/>
@@ -3695,7 +3695,23 @@
             </a:pPr>
             <a:r>
               <a:rPr lang="en-US" dirty="0"/>
-              <a:t>Appendix on Distribution calculations</a:t>
+              <a:t>Analytical </a:t>
+            </a:r>
+            <a:r>
+              <a:rPr lang="en-US" dirty="0" err="1"/>
+              <a:t>calcs</a:t>
+            </a:r>
+            <a:r>
+              <a:rPr lang="en-US" dirty="0"/>
+              <a:t> for </a:t>
+            </a:r>
+            <a:r>
+              <a:rPr lang="en-US" dirty="0" err="1"/>
+              <a:t>Enr</a:t>
+            </a:r>
+            <a:r>
+              <a:rPr lang="en-US" dirty="0"/>
+              <a:t>-yield plane bands for CDMS/Edw. </a:t>
             </a:r>
           </a:p>
           <a:p>
@@ -3705,15 +3721,15 @@
             </a:pPr>
             <a:r>
               <a:rPr lang="en-US" dirty="0"/>
-              <a:t>Conversion of yield calculations to </a:t>
+              <a:t>Comparison of ER band containment fraction from generated data and analytical </a:t>
             </a:r>
             <a:r>
               <a:rPr lang="en-US" dirty="0" err="1"/>
-              <a:t>Enr</a:t>
+              <a:t>calcs</a:t>
             </a:r>
             <a:r>
               <a:rPr lang="en-US" dirty="0"/>
-              <a:t>-yield plane (not for paper)</a:t>
+              <a:t>. For various Fer? </a:t>
             </a:r>
           </a:p>
           <a:p>
@@ -3723,7 +3739,15 @@
             </a:pPr>
             <a:r>
               <a:rPr lang="en-US" dirty="0"/>
-              <a:t>Analytical </a:t>
+              <a:t>With CDMS/</a:t>
+            </a:r>
+            <a:r>
+              <a:rPr lang="en-US" dirty="0" err="1"/>
+              <a:t>Edw</a:t>
+            </a:r>
+            <a:r>
+              <a:rPr lang="en-US" dirty="0"/>
+              <a:t> bands plot the containment fractions from simulated data compared with analytical </a:t>
             </a:r>
             <a:r>
               <a:rPr lang="en-US" dirty="0" err="1"/>
@@ -3731,16 +3755,20 @@
             </a:r>
             <a:r>
               <a:rPr lang="en-US" dirty="0"/>
-              <a:t> for </a:t>
-            </a:r>
-            <a:r>
-              <a:rPr lang="en-US" dirty="0" err="1"/>
-              <a:t>Enr</a:t>
-            </a:r>
+              <a:t>.</a:t>
+            </a:r>
+          </a:p>
+          <a:p>
+            <a:endParaRPr lang="en-US" dirty="0"/>
+          </a:p>
+          <a:p>
             <a:r>
               <a:rPr lang="en-US" dirty="0"/>
-              <a:t>-yield plane bands for CDMS/Edw. </a:t>
-            </a:r>
+              <a:t>Appendix:</a:t>
+            </a:r>
+          </a:p>
+          <a:p>
+            <a:endParaRPr lang="en-US" dirty="0"/>
           </a:p>
           <a:p>
             <a:pPr marL="342900" indent="-342900">
@@ -3749,15 +3777,7 @@
             </a:pPr>
             <a:r>
               <a:rPr lang="en-US" dirty="0"/>
-              <a:t>Comparison of ER band containment fraction from generated data and analytical </a:t>
-            </a:r>
-            <a:r>
-              <a:rPr lang="en-US" dirty="0" err="1"/>
-              <a:t>calcs</a:t>
-            </a:r>
-            <a:r>
-              <a:rPr lang="en-US" dirty="0"/>
-              <a:t>. For various Fer? </a:t>
+              <a:t>Appendix on Distribution calculations</a:t>
             </a:r>
           </a:p>
           <a:p>
@@ -3767,7 +3787,15 @@
             </a:pPr>
             <a:r>
               <a:rPr lang="en-US" dirty="0"/>
-              <a:t>Fit to CDMS yield bands to get CDMS resolutions</a:t>
+              <a:t>Conversion of yield calculations to </a:t>
+            </a:r>
+            <a:r>
+              <a:rPr lang="en-US" dirty="0" err="1"/>
+              <a:t>Enr</a:t>
+            </a:r>
+            <a:r>
+              <a:rPr lang="en-US" dirty="0"/>
+              <a:t>-yield plane (not for paper)</a:t>
             </a:r>
           </a:p>
           <a:p>
@@ -3777,23 +3805,7 @@
             </a:pPr>
             <a:r>
               <a:rPr lang="en-US" dirty="0"/>
-              <a:t>With CDMS/</a:t>
-            </a:r>
-            <a:r>
-              <a:rPr lang="en-US" dirty="0" err="1"/>
-              <a:t>Edw</a:t>
-            </a:r>
-            <a:r>
-              <a:rPr lang="en-US" dirty="0"/>
-              <a:t> bands plot the containment fractions from simulated data compared with analytical </a:t>
-            </a:r>
-            <a:r>
-              <a:rPr lang="en-US" dirty="0" err="1"/>
-              <a:t>calcs</a:t>
-            </a:r>
-            <a:r>
-              <a:rPr lang="en-US" dirty="0"/>
-              <a:t>.</a:t>
+              <a:t>Fit to CDMS yield bands to get CDMS resolutions</a:t>
             </a:r>
           </a:p>
         </p:txBody>

</xml_diff>

<commit_message>
[ANV] NR fano paper logic update
</commit_message>
<xml_diff>
--- a/notes/anthony/nrFanoPaper_logic.pptx
+++ b/notes/anthony/nrFanoPaper_logic.pptx
@@ -8,6 +8,7 @@
     <p:sldId id="256" r:id="rId2"/>
     <p:sldId id="257" r:id="rId3"/>
     <p:sldId id="258" r:id="rId4"/>
+    <p:sldId id="259" r:id="rId5"/>
   </p:sldIdLst>
   <p:sldSz cx="12192000" cy="6858000"/>
   <p:notesSz cx="6858000" cy="9144000"/>
@@ -3626,7 +3627,7 @@
         <p:spPr>
           <a:xfrm>
             <a:off x="838200" y="1690688"/>
-            <a:ext cx="10545323" cy="3693319"/>
+            <a:ext cx="10545323" cy="3970318"/>
           </a:xfrm>
           <a:prstGeom prst="rect">
             <a:avLst/>
@@ -3695,24 +3696,13 @@
             </a:pPr>
             <a:r>
               <a:rPr lang="en-US" dirty="0"/>
-              <a:t>Analytical </a:t>
-            </a:r>
-            <a:r>
-              <a:rPr lang="en-US" dirty="0" err="1"/>
-              <a:t>calcs</a:t>
-            </a:r>
-            <a:r>
-              <a:rPr lang="en-US" dirty="0"/>
-              <a:t> for </a:t>
-            </a:r>
-            <a:r>
-              <a:rPr lang="en-US" dirty="0" err="1"/>
-              <a:t>Enr</a:t>
-            </a:r>
-            <a:r>
-              <a:rPr lang="en-US" dirty="0"/>
-              <a:t>-yield plane bands for CDMS/Edw. </a:t>
-            </a:r>
+              <a:t>Text and analysis of </a:t>
+            </a:r>
+            <a:r>
+              <a:rPr lang="en-US"/>
+              <a:t>MS simulations</a:t>
+            </a:r>
+            <a:endParaRPr lang="en-US" dirty="0"/>
           </a:p>
           <a:p>
             <a:pPr marL="342900" indent="-342900">
@@ -3721,7 +3711,7 @@
             </a:pPr>
             <a:r>
               <a:rPr lang="en-US" dirty="0"/>
-              <a:t>Comparison of ER band containment fraction from generated data and analytical </a:t>
+              <a:t>Analytical </a:t>
             </a:r>
             <a:r>
               <a:rPr lang="en-US" dirty="0" err="1"/>
@@ -3729,7 +3719,15 @@
             </a:r>
             <a:r>
               <a:rPr lang="en-US" dirty="0"/>
-              <a:t>. For various Fer? </a:t>
+              <a:t> for </a:t>
+            </a:r>
+            <a:r>
+              <a:rPr lang="en-US" dirty="0" err="1"/>
+              <a:t>Enr</a:t>
+            </a:r>
+            <a:r>
+              <a:rPr lang="en-US" dirty="0"/>
+              <a:t>-yield plane bands for CDMS/Edw. </a:t>
             </a:r>
           </a:p>
           <a:p>
@@ -3739,15 +3737,7 @@
             </a:pPr>
             <a:r>
               <a:rPr lang="en-US" dirty="0"/>
-              <a:t>With CDMS/</a:t>
-            </a:r>
-            <a:r>
-              <a:rPr lang="en-US" dirty="0" err="1"/>
-              <a:t>Edw</a:t>
-            </a:r>
-            <a:r>
-              <a:rPr lang="en-US" dirty="0"/>
-              <a:t> bands plot the containment fractions from simulated data compared with analytical </a:t>
+              <a:t>Comparison of ER band containment fraction from generated data and analytical </a:t>
             </a:r>
             <a:r>
               <a:rPr lang="en-US" dirty="0" err="1"/>
@@ -3755,7 +3745,7 @@
             </a:r>
             <a:r>
               <a:rPr lang="en-US" dirty="0"/>
-              <a:t>.</a:t>
+              <a:t>. For various Fer? </a:t>
             </a:r>
           </a:p>
           <a:p>
@@ -3765,25 +3755,24 @@
             </a:pPr>
             <a:r>
               <a:rPr lang="en-US" dirty="0"/>
-              <a:t>Impact on DM searches? </a:t>
-            </a:r>
-            <a:r>
-              <a:rPr lang="en-US"/>
-              <a:t>– extrapolation to low masses. </a:t>
-            </a:r>
-            <a:endParaRPr lang="en-US" dirty="0"/>
-          </a:p>
-          <a:p>
-            <a:endParaRPr lang="en-US" dirty="0"/>
-          </a:p>
-          <a:p>
+              <a:t>With CDMS/</a:t>
+            </a:r>
+            <a:r>
+              <a:rPr lang="en-US" dirty="0" err="1"/>
+              <a:t>Edw</a:t>
+            </a:r>
             <a:r>
               <a:rPr lang="en-US" dirty="0"/>
-              <a:t>Appendix:</a:t>
-            </a:r>
-          </a:p>
-          <a:p>
-            <a:endParaRPr lang="en-US" dirty="0"/>
+              <a:t> bands plot the containment fractions from simulated data compared with analytical </a:t>
+            </a:r>
+            <a:r>
+              <a:rPr lang="en-US" dirty="0" err="1"/>
+              <a:t>calcs</a:t>
+            </a:r>
+            <a:r>
+              <a:rPr lang="en-US" dirty="0"/>
+              <a:t>.</a:t>
+            </a:r>
           </a:p>
           <a:p>
             <a:pPr marL="342900" indent="-342900">
@@ -3792,8 +3781,20 @@
             </a:pPr>
             <a:r>
               <a:rPr lang="en-US" dirty="0"/>
-              <a:t>Appendix on Distribution calculations</a:t>
-            </a:r>
+              <a:t>Impact on DM searches? – extrapolation to low masses. </a:t>
+            </a:r>
+          </a:p>
+          <a:p>
+            <a:endParaRPr lang="en-US" dirty="0"/>
+          </a:p>
+          <a:p>
+            <a:r>
+              <a:rPr lang="en-US" dirty="0"/>
+              <a:t>Appendix:</a:t>
+            </a:r>
+          </a:p>
+          <a:p>
+            <a:endParaRPr lang="en-US" dirty="0"/>
           </a:p>
           <a:p>
             <a:pPr marL="342900" indent="-342900">
@@ -3802,15 +3803,7 @@
             </a:pPr>
             <a:r>
               <a:rPr lang="en-US" dirty="0"/>
-              <a:t>Conversion of yield calculations to </a:t>
-            </a:r>
-            <a:r>
-              <a:rPr lang="en-US" dirty="0" err="1"/>
-              <a:t>Enr</a:t>
-            </a:r>
-            <a:r>
-              <a:rPr lang="en-US" dirty="0"/>
-              <a:t>-yield plane (not for paper)</a:t>
+              <a:t>Appendix on Distribution calculations</a:t>
             </a:r>
           </a:p>
           <a:p>
@@ -3820,6 +3813,24 @@
             </a:pPr>
             <a:r>
               <a:rPr lang="en-US" dirty="0"/>
+              <a:t>Conversion of yield calculations to </a:t>
+            </a:r>
+            <a:r>
+              <a:rPr lang="en-US" dirty="0" err="1"/>
+              <a:t>Enr</a:t>
+            </a:r>
+            <a:r>
+              <a:rPr lang="en-US" dirty="0"/>
+              <a:t>-yield plane (not for paper)</a:t>
+            </a:r>
+          </a:p>
+          <a:p>
+            <a:pPr marL="342900" indent="-342900">
+              <a:buFont typeface="+mj-lt"/>
+              <a:buAutoNum type="arabicPeriod"/>
+            </a:pPr>
+            <a:r>
+              <a:rPr lang="en-US" dirty="0"/>
               <a:t>Fit to CDMS yield bands to get CDMS resolutions</a:t>
             </a:r>
           </a:p>
@@ -3829,6 +3840,343 @@
     <p:extLst>
       <p:ext uri="{BB962C8B-B14F-4D97-AF65-F5344CB8AC3E}">
         <p14:creationId xmlns:p14="http://schemas.microsoft.com/office/powerpoint/2010/main" val="3679731822"/>
+      </p:ext>
+    </p:extLst>
+  </p:cSld>
+  <p:clrMapOvr>
+    <a:masterClrMapping/>
+  </p:clrMapOvr>
+</p:sld>
+</file>
+
+<file path=ppt/slides/slide4.xml><?xml version="1.0" encoding="utf-8"?>
+<p:sld xmlns:a="http://schemas.openxmlformats.org/drawingml/2006/main" xmlns:r="http://schemas.openxmlformats.org/officeDocument/2006/relationships" xmlns:p="http://schemas.openxmlformats.org/presentationml/2006/main">
+  <p:cSld>
+    <p:spTree>
+      <p:nvGrpSpPr>
+        <p:cNvPr id="1" name=""/>
+        <p:cNvGrpSpPr/>
+        <p:nvPr/>
+      </p:nvGrpSpPr>
+      <p:grpSpPr>
+        <a:xfrm>
+          <a:off x="0" y="0"/>
+          <a:ext cx="0" cy="0"/>
+          <a:chOff x="0" y="0"/>
+          <a:chExt cx="0" cy="0"/>
+        </a:xfrm>
+      </p:grpSpPr>
+      <p:sp>
+        <p:nvSpPr>
+          <p:cNvPr id="2" name="Title 1">
+            <a:extLst>
+              <a:ext uri="{FF2B5EF4-FFF2-40B4-BE49-F238E27FC236}">
+                <a16:creationId xmlns:a16="http://schemas.microsoft.com/office/drawing/2014/main" id="{368F9A84-CB96-414E-A8F7-8F56FA756142}"/>
+              </a:ext>
+            </a:extLst>
+          </p:cNvPr>
+          <p:cNvSpPr>
+            <a:spLocks noGrp="1"/>
+          </p:cNvSpPr>
+          <p:nvPr>
+            <p:ph type="title"/>
+          </p:nvPr>
+        </p:nvSpPr>
+        <p:spPr/>
+        <p:txBody>
+          <a:bodyPr/>
+          <a:lstStyle/>
+          <a:p>
+            <a:r>
+              <a:rPr lang="en-US" dirty="0"/>
+              <a:t>Extraction of Edelweiss “F”</a:t>
+            </a:r>
+          </a:p>
+        </p:txBody>
+      </p:sp>
+      <mc:AlternateContent xmlns:mc="http://schemas.openxmlformats.org/markup-compatibility/2006">
+        <mc:Choice xmlns:a14="http://schemas.microsoft.com/office/drawing/2010/main" Requires="a14">
+          <p:sp>
+            <p:nvSpPr>
+              <p:cNvPr id="3" name="TextBox 2">
+                <a:extLst>
+                  <a:ext uri="{FF2B5EF4-FFF2-40B4-BE49-F238E27FC236}">
+                    <a16:creationId xmlns:a16="http://schemas.microsoft.com/office/drawing/2014/main" id="{E75A5DD0-7A67-A943-9F4D-77B67FDA397C}"/>
+                  </a:ext>
+                </a:extLst>
+              </p:cNvPr>
+              <p:cNvSpPr txBox="1"/>
+              <p:nvPr/>
+            </p:nvSpPr>
+            <p:spPr>
+              <a:xfrm>
+                <a:off x="838200" y="1690688"/>
+                <a:ext cx="6618543" cy="646331"/>
+              </a:xfrm>
+              <a:prstGeom prst="rect">
+                <a:avLst/>
+              </a:prstGeom>
+              <a:noFill/>
+            </p:spPr>
+            <p:txBody>
+              <a:bodyPr wrap="none" rtlCol="0">
+                <a:spAutoFit/>
+              </a:bodyPr>
+              <a:lstStyle/>
+              <a:p>
+                <a:pPr marL="342900" indent="-342900">
+                  <a:buFont typeface="+mj-lt"/>
+                  <a:buAutoNum type="arabicPeriod"/>
+                </a:pPr>
+                <a:r>
+                  <a:rPr lang="en-US" dirty="0"/>
+                  <a:t>Calculate (from Arvind’s v2 function) </a:t>
+                </a:r>
+                <a14:m>
+                  <m:oMath xmlns:m="http://schemas.openxmlformats.org/officeDocument/2006/math">
+                    <m:sSub>
+                      <m:sSubPr>
+                        <m:ctrlPr>
+                          <a:rPr lang="en-US" b="0" i="1" smtClean="0">
+                            <a:latin typeface="Cambria Math" panose="02040503050406030204" pitchFamily="18" charset="0"/>
+                          </a:rPr>
+                        </m:ctrlPr>
+                      </m:sSubPr>
+                      <m:e>
+                        <m:r>
+                          <a:rPr lang="en-US" b="0" i="1" smtClean="0">
+                            <a:latin typeface="Cambria Math" panose="02040503050406030204" pitchFamily="18" charset="0"/>
+                          </a:rPr>
+                          <m:t>𝜎</m:t>
+                        </m:r>
+                      </m:e>
+                      <m:sub>
+                        <m:r>
+                          <a:rPr lang="en-US" b="0" i="1" smtClean="0">
+                            <a:latin typeface="Cambria Math" panose="02040503050406030204" pitchFamily="18" charset="0"/>
+                          </a:rPr>
+                          <m:t>𝑌</m:t>
+                        </m:r>
+                      </m:sub>
+                    </m:sSub>
+                    <m:d>
+                      <m:dPr>
+                        <m:ctrlPr>
+                          <a:rPr lang="en-US" b="0" i="1" smtClean="0">
+                            <a:latin typeface="Cambria Math" panose="02040503050406030204" pitchFamily="18" charset="0"/>
+                          </a:rPr>
+                        </m:ctrlPr>
+                      </m:dPr>
+                      <m:e>
+                        <m:sSub>
+                          <m:sSubPr>
+                            <m:ctrlPr>
+                              <a:rPr lang="en-US" b="0" i="1" smtClean="0">
+                                <a:latin typeface="Cambria Math" panose="02040503050406030204" pitchFamily="18" charset="0"/>
+                              </a:rPr>
+                            </m:ctrlPr>
+                          </m:sSubPr>
+                          <m:e>
+                            <m:r>
+                              <a:rPr lang="en-US" b="0" i="1" smtClean="0">
+                                <a:latin typeface="Cambria Math" panose="02040503050406030204" pitchFamily="18" charset="0"/>
+                              </a:rPr>
+                              <m:t>𝐸</m:t>
+                            </m:r>
+                          </m:e>
+                          <m:sub>
+                            <m:r>
+                              <a:rPr lang="en-US" b="0" i="1" smtClean="0">
+                                <a:latin typeface="Cambria Math" panose="02040503050406030204" pitchFamily="18" charset="0"/>
+                              </a:rPr>
+                              <m:t>𝑟</m:t>
+                            </m:r>
+                          </m:sub>
+                        </m:sSub>
+                        <m:r>
+                          <a:rPr lang="en-US" b="0" i="1" smtClean="0">
+                            <a:latin typeface="Cambria Math" panose="02040503050406030204" pitchFamily="18" charset="0"/>
+                          </a:rPr>
+                          <m:t>, </m:t>
+                        </m:r>
+                        <m:r>
+                          <a:rPr lang="en-US" b="0" i="1" smtClean="0">
+                            <a:latin typeface="Cambria Math" panose="02040503050406030204" pitchFamily="18" charset="0"/>
+                          </a:rPr>
+                          <m:t>𝐹</m:t>
+                        </m:r>
+                        <m:r>
+                          <a:rPr lang="en-US" b="0" i="1" smtClean="0">
+                            <a:latin typeface="Cambria Math" panose="02040503050406030204" pitchFamily="18" charset="0"/>
+                          </a:rPr>
+                          <m:t>=0</m:t>
+                        </m:r>
+                      </m:e>
+                    </m:d>
+                    <m:r>
+                      <a:rPr lang="en-US" b="0" i="1" smtClean="0">
+                        <a:latin typeface="Cambria Math" panose="02040503050406030204" pitchFamily="18" charset="0"/>
+                      </a:rPr>
+                      <m:t> −</m:t>
+                    </m:r>
+                    <m:sSub>
+                      <m:sSubPr>
+                        <m:ctrlPr>
+                          <a:rPr lang="en-US" b="0" i="1" smtClean="0">
+                            <a:latin typeface="Cambria Math" panose="02040503050406030204" pitchFamily="18" charset="0"/>
+                          </a:rPr>
+                        </m:ctrlPr>
+                      </m:sSubPr>
+                      <m:e>
+                        <m:r>
+                          <a:rPr lang="en-US" b="0" i="1" smtClean="0">
+                            <a:latin typeface="Cambria Math" panose="02040503050406030204" pitchFamily="18" charset="0"/>
+                          </a:rPr>
+                          <m:t>𝜎</m:t>
+                        </m:r>
+                      </m:e>
+                      <m:sub>
+                        <m:r>
+                          <a:rPr lang="en-US" b="0" i="1" smtClean="0">
+                            <a:latin typeface="Cambria Math" panose="02040503050406030204" pitchFamily="18" charset="0"/>
+                          </a:rPr>
+                          <m:t>𝑌</m:t>
+                        </m:r>
+                      </m:sub>
+                    </m:sSub>
+                    <m:d>
+                      <m:dPr>
+                        <m:ctrlPr>
+                          <a:rPr lang="en-US" b="0" i="1" smtClean="0">
+                            <a:latin typeface="Cambria Math" panose="02040503050406030204" pitchFamily="18" charset="0"/>
+                          </a:rPr>
+                        </m:ctrlPr>
+                      </m:dPr>
+                      <m:e>
+                        <m:sSub>
+                          <m:sSubPr>
+                            <m:ctrlPr>
+                              <a:rPr lang="en-US" b="0" i="1" smtClean="0">
+                                <a:latin typeface="Cambria Math" panose="02040503050406030204" pitchFamily="18" charset="0"/>
+                              </a:rPr>
+                            </m:ctrlPr>
+                          </m:sSubPr>
+                          <m:e>
+                            <m:r>
+                              <a:rPr lang="en-US" b="0" i="1" smtClean="0">
+                                <a:latin typeface="Cambria Math" panose="02040503050406030204" pitchFamily="18" charset="0"/>
+                              </a:rPr>
+                              <m:t>𝐸</m:t>
+                            </m:r>
+                          </m:e>
+                          <m:sub>
+                            <m:r>
+                              <a:rPr lang="en-US" b="0" i="1" smtClean="0">
+                                <a:latin typeface="Cambria Math" panose="02040503050406030204" pitchFamily="18" charset="0"/>
+                              </a:rPr>
+                              <m:t>𝑟</m:t>
+                            </m:r>
+                          </m:sub>
+                        </m:sSub>
+                        <m:r>
+                          <a:rPr lang="en-US" b="0" i="1" smtClean="0">
+                            <a:latin typeface="Cambria Math" panose="02040503050406030204" pitchFamily="18" charset="0"/>
+                          </a:rPr>
+                          <m:t>,</m:t>
+                        </m:r>
+                        <m:r>
+                          <a:rPr lang="en-US" b="0" i="1" smtClean="0">
+                            <a:latin typeface="Cambria Math" panose="02040503050406030204" pitchFamily="18" charset="0"/>
+                          </a:rPr>
+                          <m:t>𝐹</m:t>
+                        </m:r>
+                      </m:e>
+                    </m:d>
+                  </m:oMath>
+                </a14:m>
+                <a:r>
+                  <a:rPr lang="en-US" dirty="0"/>
+                  <a:t> </a:t>
+                </a:r>
+              </a:p>
+              <a:p>
+                <a:pPr marL="342900" indent="-342900">
+                  <a:buFont typeface="+mj-lt"/>
+                  <a:buAutoNum type="arabicPeriod"/>
+                </a:pPr>
+                <a:r>
+                  <a:rPr lang="en-US" dirty="0"/>
+                  <a:t>match up with </a:t>
+                </a:r>
+                <a:r>
+                  <a:rPr lang="en-US" dirty="0" err="1"/>
+                  <a:t>Edw</a:t>
+                </a:r>
+                <a:r>
+                  <a:rPr lang="en-US" dirty="0"/>
+                  <a:t> C to get F(</a:t>
+                </a:r>
+                <a:r>
+                  <a:rPr lang="en-US" dirty="0" err="1"/>
+                  <a:t>Er</a:t>
+                </a:r>
+                <a:r>
+                  <a:rPr lang="en-US" dirty="0"/>
+                  <a:t>)</a:t>
+                </a:r>
+              </a:p>
+            </p:txBody>
+          </p:sp>
+        </mc:Choice>
+        <mc:Fallback>
+          <p:sp>
+            <p:nvSpPr>
+              <p:cNvPr id="3" name="TextBox 2">
+                <a:extLst>
+                  <a:ext uri="{FF2B5EF4-FFF2-40B4-BE49-F238E27FC236}">
+                    <a16:creationId xmlns:a16="http://schemas.microsoft.com/office/drawing/2014/main" id="{E75A5DD0-7A67-A943-9F4D-77B67FDA397C}"/>
+                  </a:ext>
+                </a:extLst>
+              </p:cNvPr>
+              <p:cNvSpPr txBox="1">
+                <a:spLocks noRot="1" noChangeAspect="1" noMove="1" noResize="1" noEditPoints="1" noAdjustHandles="1" noChangeArrowheads="1" noChangeShapeType="1" noTextEdit="1"/>
+              </p:cNvSpPr>
+              <p:nvPr/>
+            </p:nvSpPr>
+            <p:spPr>
+              <a:xfrm>
+                <a:off x="838200" y="1690688"/>
+                <a:ext cx="6618543" cy="646331"/>
+              </a:xfrm>
+              <a:prstGeom prst="rect">
+                <a:avLst/>
+              </a:prstGeom>
+              <a:blipFill>
+                <a:blip r:embed="rId2"/>
+                <a:stretch>
+                  <a:fillRect l="-766" t="-1923" b="-13462"/>
+                </a:stretch>
+              </a:blipFill>
+            </p:spPr>
+            <p:txBody>
+              <a:bodyPr/>
+              <a:lstStyle/>
+              <a:p>
+                <a:r>
+                  <a:rPr lang="en-US">
+                    <a:noFill/>
+                  </a:rPr>
+                  <a:t> </a:t>
+                </a:r>
+              </a:p>
+            </p:txBody>
+          </p:sp>
+        </mc:Fallback>
+      </mc:AlternateContent>
+    </p:spTree>
+    <p:extLst>
+      <p:ext uri="{BB962C8B-B14F-4D97-AF65-F5344CB8AC3E}">
+        <p14:creationId xmlns:p14="http://schemas.microsoft.com/office/powerpoint/2010/main" val="2994318958"/>
       </p:ext>
     </p:extLst>
   </p:cSld>

</xml_diff>

<commit_message>
[ANV] modifying the plan for the paper
</commit_message>
<xml_diff>
--- a/notes/anthony/nrFanoPaper_logic.pptx
+++ b/notes/anthony/nrFanoPaper_logic.pptx
@@ -9,6 +9,7 @@
     <p:sldId id="257" r:id="rId3"/>
     <p:sldId id="258" r:id="rId4"/>
     <p:sldId id="259" r:id="rId5"/>
+    <p:sldId id="260" r:id="rId6"/>
   </p:sldIdLst>
   <p:sldSz cx="12192000" cy="6858000"/>
   <p:notesSz cx="6858000" cy="9144000"/>
@@ -3627,7 +3628,7 @@
         <p:spPr>
           <a:xfrm>
             <a:off x="838200" y="1690688"/>
-            <a:ext cx="10545323" cy="3970318"/>
+            <a:ext cx="10545323" cy="4247317"/>
           </a:xfrm>
           <a:prstGeom prst="rect">
             <a:avLst/>
@@ -3696,13 +3697,8 @@
             </a:pPr>
             <a:r>
               <a:rPr lang="en-US" dirty="0"/>
-              <a:t>Text and analysis of </a:t>
-            </a:r>
-            <a:r>
-              <a:rPr lang="en-US"/>
-              <a:t>MS simulations</a:t>
-            </a:r>
-            <a:endParaRPr lang="en-US" dirty="0"/>
+              <a:t>Error estimation on ”C” </a:t>
+            </a:r>
           </a:p>
           <a:p>
             <a:pPr marL="342900" indent="-342900">
@@ -3728,6 +3724,16 @@
             <a:r>
               <a:rPr lang="en-US" dirty="0"/>
               <a:t>-yield plane bands for CDMS/Edw. </a:t>
+            </a:r>
+          </a:p>
+          <a:p>
+            <a:pPr marL="342900" indent="-342900">
+              <a:buFont typeface="+mj-lt"/>
+              <a:buAutoNum type="arabicPeriod"/>
+            </a:pPr>
+            <a:r>
+              <a:rPr lang="en-US" dirty="0"/>
+              <a:t>Text and analysis of MS simulations</a:t>
             </a:r>
           </a:p>
           <a:p>
@@ -4177,6 +4183,242 @@
     <p:extLst>
       <p:ext uri="{BB962C8B-B14F-4D97-AF65-F5344CB8AC3E}">
         <p14:creationId xmlns:p14="http://schemas.microsoft.com/office/powerpoint/2010/main" val="2994318958"/>
+      </p:ext>
+    </p:extLst>
+  </p:cSld>
+  <p:clrMapOvr>
+    <a:masterClrMapping/>
+  </p:clrMapOvr>
+</p:sld>
+</file>
+
+<file path=ppt/slides/slide5.xml><?xml version="1.0" encoding="utf-8"?>
+<p:sld xmlns:a="http://schemas.openxmlformats.org/drawingml/2006/main" xmlns:r="http://schemas.openxmlformats.org/officeDocument/2006/relationships" xmlns:p="http://schemas.openxmlformats.org/presentationml/2006/main">
+  <p:cSld>
+    <p:spTree>
+      <p:nvGrpSpPr>
+        <p:cNvPr id="1" name=""/>
+        <p:cNvGrpSpPr/>
+        <p:nvPr/>
+      </p:nvGrpSpPr>
+      <p:grpSpPr>
+        <a:xfrm>
+          <a:off x="0" y="0"/>
+          <a:ext cx="0" cy="0"/>
+          <a:chOff x="0" y="0"/>
+          <a:chExt cx="0" cy="0"/>
+        </a:xfrm>
+      </p:grpSpPr>
+      <p:sp>
+        <p:nvSpPr>
+          <p:cNvPr id="2" name="Title 1">
+            <a:extLst>
+              <a:ext uri="{FF2B5EF4-FFF2-40B4-BE49-F238E27FC236}">
+                <a16:creationId xmlns:a16="http://schemas.microsoft.com/office/drawing/2014/main" id="{368F9A84-CB96-414E-A8F7-8F56FA756142}"/>
+              </a:ext>
+            </a:extLst>
+          </p:cNvPr>
+          <p:cNvSpPr>
+            <a:spLocks noGrp="1"/>
+          </p:cNvSpPr>
+          <p:nvPr>
+            <p:ph type="title"/>
+          </p:nvPr>
+        </p:nvSpPr>
+        <p:spPr/>
+        <p:txBody>
+          <a:bodyPr/>
+          <a:lstStyle/>
+          <a:p>
+            <a:r>
+              <a:rPr lang="en-US" dirty="0"/>
+              <a:t>Text and Analysis of MS Simulation</a:t>
+            </a:r>
+          </a:p>
+        </p:txBody>
+      </p:sp>
+      <mc:AlternateContent xmlns:mc="http://schemas.openxmlformats.org/markup-compatibility/2006">
+        <mc:Choice xmlns:a14="http://schemas.microsoft.com/office/drawing/2010/main" Requires="a14">
+          <p:sp>
+            <p:nvSpPr>
+              <p:cNvPr id="3" name="TextBox 2">
+                <a:extLst>
+                  <a:ext uri="{FF2B5EF4-FFF2-40B4-BE49-F238E27FC236}">
+                    <a16:creationId xmlns:a16="http://schemas.microsoft.com/office/drawing/2014/main" id="{E75A5DD0-7A67-A943-9F4D-77B67FDA397C}"/>
+                  </a:ext>
+                </a:extLst>
+              </p:cNvPr>
+              <p:cNvSpPr txBox="1"/>
+              <p:nvPr/>
+            </p:nvSpPr>
+            <p:spPr>
+              <a:xfrm>
+                <a:off x="838201" y="1690688"/>
+                <a:ext cx="10975428" cy="1754326"/>
+              </a:xfrm>
+              <a:prstGeom prst="rect">
+                <a:avLst/>
+              </a:prstGeom>
+              <a:noFill/>
+            </p:spPr>
+            <p:txBody>
+              <a:bodyPr wrap="square" rtlCol="0">
+                <a:spAutoFit/>
+              </a:bodyPr>
+              <a:lstStyle/>
+              <a:p>
+                <a:pPr marL="342900" indent="-342900">
+                  <a:buFont typeface="+mj-lt"/>
+                  <a:buAutoNum type="arabicPeriod"/>
+                </a:pPr>
+                <a:r>
+                  <a:rPr lang="en-US" dirty="0"/>
+                  <a:t>Using the v2 generation-scheme simulate the full MS band for both CDMS-II and </a:t>
+                </a:r>
+                <a:r>
+                  <a:rPr lang="en-US" dirty="0" err="1"/>
+                  <a:t>Edw</a:t>
+                </a:r>
+                <a:r>
+                  <a:rPr lang="en-US" dirty="0"/>
+                  <a:t>, with no Fano included</a:t>
+                </a:r>
+              </a:p>
+              <a:p>
+                <a:pPr marL="342900" indent="-342900">
+                  <a:buFont typeface="+mj-lt"/>
+                  <a:buAutoNum type="arabicPeriod"/>
+                </a:pPr>
+                <a:r>
+                  <a:rPr lang="en-US" dirty="0"/>
+                  <a:t>Obtain analytical band from the v2 function with </a:t>
+                </a:r>
+                <a:r>
+                  <a:rPr lang="en-US" dirty="0" err="1"/>
+                  <a:t>Edw</a:t>
+                </a:r>
+                <a:r>
+                  <a:rPr lang="en-US" dirty="0"/>
+                  <a:t> F</a:t>
+                </a:r>
+              </a:p>
+              <a:p>
+                <a:pPr marL="342900" indent="-342900">
+                  <a:buFont typeface="+mj-lt"/>
+                  <a:buAutoNum type="arabicPeriod"/>
+                </a:pPr>
+                <a:r>
+                  <a:rPr lang="en-US" dirty="0"/>
+                  <a:t>Obtain analytical band from the v2 function with </a:t>
+                </a:r>
+                <a:r>
+                  <a:rPr lang="en-US" dirty="0" err="1"/>
+                  <a:t>Edw</a:t>
+                </a:r>
+                <a:r>
+                  <a:rPr lang="en-US" dirty="0"/>
+                  <a:t> F=0</a:t>
+                </a:r>
+              </a:p>
+              <a:p>
+                <a:pPr marL="342900" indent="-342900">
+                  <a:buFont typeface="+mj-lt"/>
+                  <a:buAutoNum type="arabicPeriod"/>
+                </a:pPr>
+                <a:r>
+                  <a:rPr lang="en-US" dirty="0"/>
+                  <a:t>Subtract </a:t>
+                </a:r>
+              </a:p>
+              <a:p>
+                <a:pPr marL="342900" indent="-342900">
+                  <a:buFont typeface="+mj-lt"/>
+                  <a:buAutoNum type="arabicPeriod"/>
+                </a:pPr>
+                <a:r>
+                  <a:rPr lang="en-US" dirty="0"/>
+                  <a:t>Overlay the analytical band from the v2 function onto MS data at 3</a:t>
+                </a:r>
+                <a14:m>
+                  <m:oMath xmlns:m="http://schemas.openxmlformats.org/officeDocument/2006/math">
+                    <m:r>
+                      <a:rPr lang="en-US" b="0" i="1" smtClean="0">
+                        <a:latin typeface="Cambria Math" panose="02040503050406030204" pitchFamily="18" charset="0"/>
+                      </a:rPr>
+                      <m:t>𝜎</m:t>
+                    </m:r>
+                  </m:oMath>
+                </a14:m>
+                <a:r>
+                  <a:rPr lang="en-US" dirty="0"/>
+                  <a:t> and argue the containment is too high still?</a:t>
+                </a:r>
+              </a:p>
+              <a:p>
+                <a:pPr marL="342900" indent="-342900">
+                  <a:buFont typeface="+mj-lt"/>
+                  <a:buAutoNum type="arabicPeriod"/>
+                </a:pPr>
+                <a:r>
+                  <a:rPr lang="en-US" dirty="0">
+                    <a:sym typeface="Wingdings" pitchFamily="2" charset="2"/>
+                  </a:rPr>
+                  <a:t> MS cannot account for this widening</a:t>
+                </a:r>
+                <a:endParaRPr lang="en-US" dirty="0"/>
+              </a:p>
+            </p:txBody>
+          </p:sp>
+        </mc:Choice>
+        <mc:Fallback>
+          <p:sp>
+            <p:nvSpPr>
+              <p:cNvPr id="3" name="TextBox 2">
+                <a:extLst>
+                  <a:ext uri="{FF2B5EF4-FFF2-40B4-BE49-F238E27FC236}">
+                    <a16:creationId xmlns:a16="http://schemas.microsoft.com/office/drawing/2014/main" id="{E75A5DD0-7A67-A943-9F4D-77B67FDA397C}"/>
+                  </a:ext>
+                </a:extLst>
+              </p:cNvPr>
+              <p:cNvSpPr txBox="1">
+                <a:spLocks noRot="1" noChangeAspect="1" noMove="1" noResize="1" noEditPoints="1" noAdjustHandles="1" noChangeArrowheads="1" noChangeShapeType="1" noTextEdit="1"/>
+              </p:cNvSpPr>
+              <p:nvPr/>
+            </p:nvSpPr>
+            <p:spPr>
+              <a:xfrm>
+                <a:off x="838201" y="1690688"/>
+                <a:ext cx="10975428" cy="1754326"/>
+              </a:xfrm>
+              <a:prstGeom prst="rect">
+                <a:avLst/>
+              </a:prstGeom>
+              <a:blipFill>
+                <a:blip r:embed="rId2"/>
+                <a:stretch>
+                  <a:fillRect l="-462" t="-719" r="-116" b="-4317"/>
+                </a:stretch>
+              </a:blipFill>
+            </p:spPr>
+            <p:txBody>
+              <a:bodyPr/>
+              <a:lstStyle/>
+              <a:p>
+                <a:r>
+                  <a:rPr lang="en-US">
+                    <a:noFill/>
+                  </a:rPr>
+                  <a:t> </a:t>
+                </a:r>
+              </a:p>
+            </p:txBody>
+          </p:sp>
+        </mc:Fallback>
+      </mc:AlternateContent>
+    </p:spTree>
+    <p:extLst>
+      <p:ext uri="{BB962C8B-B14F-4D97-AF65-F5344CB8AC3E}">
+        <p14:creationId xmlns:p14="http://schemas.microsoft.com/office/powerpoint/2010/main" val="3225477534"/>
       </p:ext>
     </p:extLst>
   </p:cSld>

</xml_diff>